<commit_message>
Dodano jeszcze opis komendy git pull
</commit_message>
<xml_diff>
--- a/GIT presentation.pptx
+++ b/GIT presentation.pptx
@@ -251,7 +251,7 @@
           <a:p>
             <a:fld id="{D66B3734-EDD0-42D6-A8D9-93434022A17C}" type="datetimeFigureOut">
               <a:rPr lang="en-US" smtClean="0"/>
-              <a:t>12/15/2017</a:t>
+              <a:t>1/4/2018</a:t>
             </a:fld>
             <a:endParaRPr lang="en-US"/>
           </a:p>
@@ -1021,7 +1021,7 @@
             <a:fld id="{91357E40-7782-4555-8EA1-82F7A5D47C75}" type="datetime1">
               <a:rPr lang="en-US" smtClean="0"/>
               <a:pPr/>
-              <a:t>12/15/2017</a:t>
+              <a:t>1/4/2018</a:t>
             </a:fld>
             <a:endParaRPr lang="en-US" dirty="0"/>
           </a:p>
@@ -1401,7 +1401,7 @@
             <a:fld id="{E07D0049-9CEF-4AE6-99D0-2197C36D1BF3}" type="datetime1">
               <a:rPr lang="en-US"/>
               <a:pPr/>
-              <a:t>12/15/2017</a:t>
+              <a:t>1/4/2018</a:t>
             </a:fld>
             <a:endParaRPr lang="en-US"/>
           </a:p>
@@ -1463,7 +1463,7 @@
             <a:fld id="{F8A97332-E39C-724D-A070-905544DDF077}" type="datetime1">
               <a:rPr lang="en-US" smtClean="0"/>
               <a:pPr/>
-              <a:t>12/15/2017</a:t>
+              <a:t>1/4/2018</a:t>
             </a:fld>
             <a:endParaRPr lang="en-US"/>
           </a:p>
@@ -2544,7 +2544,7 @@
           <a:p>
             <a:fld id="{6EF3B2EA-6995-41EB-91A7-4061891AEF21}" type="datetimeFigureOut">
               <a:rPr lang="en-US" smtClean="0"/>
-              <a:t>12/15/2017</a:t>
+              <a:t>1/4/2018</a:t>
             </a:fld>
             <a:endParaRPr lang="en-US"/>
           </a:p>
@@ -4609,7 +4609,7 @@
               <a:pPr>
                 <a:defRPr/>
               </a:pPr>
-              <a:t>15/12/2017</a:t>
+              <a:t>04/01/2018</a:t>
             </a:fld>
             <a:endParaRPr lang="en-GB" sz="1067" dirty="0">
               <a:latin typeface="+mn-lt"/>
@@ -6654,7 +6654,7 @@
               <a:pPr>
                 <a:defRPr/>
               </a:pPr>
-              <a:t>15/12/2017</a:t>
+              <a:t>04/01/2018</a:t>
             </a:fld>
             <a:endParaRPr lang="en-GB" sz="1067" dirty="0">
               <a:solidFill>
@@ -21421,23 +21421,34 @@
         </p:nvSpPr>
         <p:spPr>
           <a:xfrm>
-            <a:off x="509095" y="1027290"/>
-            <a:ext cx="11321299" cy="3416320"/>
+            <a:off x="509091" y="1081273"/>
+            <a:ext cx="11321299" cy="2308324"/>
           </a:xfrm>
           <a:prstGeom prst="rect">
             <a:avLst/>
           </a:prstGeom>
-          <a:noFill/>
-        </p:spPr>
+          <a:ln/>
+        </p:spPr>
+        <p:style>
+          <a:lnRef idx="2">
+            <a:schemeClr val="dk1"/>
+          </a:lnRef>
+          <a:fillRef idx="1">
+            <a:schemeClr val="lt1"/>
+          </a:fillRef>
+          <a:effectRef idx="0">
+            <a:schemeClr val="dk1"/>
+          </a:effectRef>
+          <a:fontRef idx="minor">
+            <a:schemeClr val="dk1"/>
+          </a:fontRef>
+        </p:style>
         <p:txBody>
           <a:bodyPr wrap="square" rtlCol="0">
             <a:spAutoFit/>
           </a:bodyPr>
           <a:lstStyle/>
           <a:p>
-            <a:endParaRPr lang="pl-PL" sz="2400" i="1" dirty="0"/>
-          </a:p>
-          <a:p>
             <a:r>
               <a:rPr lang="pl-PL" sz="2400" i="1" dirty="0" err="1"/>
               <a:t>Command</a:t>
@@ -21519,20 +21530,145 @@
             </a:r>
             <a:r>
               <a:rPr lang="en-US" sz="2133" i="1" dirty="0"/>
-              <a:t>git clone ssh://szymczys@gerrite1.ext.net.nokia.com:8282/netact/nasda</a:t>
-            </a:r>
-            <a:endParaRPr lang="pl-PL" sz="2133" i="1" dirty="0"/>
-          </a:p>
-          <a:p>
+              <a:t>git clone ssh://szymczys@gerrite1.ext.net.nokia.com:8282/netact/nasd</a:t>
+            </a:r>
+            <a:r>
+              <a:rPr lang="pl-PL" sz="2133" i="1" dirty="0"/>
+              <a:t>a</a:t>
+            </a:r>
+            <a:r>
+              <a:rPr lang="pl-PL" sz="2400" i="1" dirty="0"/>
+              <a:t>			 </a:t>
+            </a:r>
+            <a:endParaRPr lang="en-US" sz="2400" i="1" dirty="0"/>
+          </a:p>
+        </p:txBody>
+      </p:sp>
+      <p:sp>
+        <p:nvSpPr>
+          <p:cNvPr id="5" name="TextBox 4">
+            <a:extLst>
+              <a:ext uri="{FF2B5EF4-FFF2-40B4-BE49-F238E27FC236}">
+                <a16:creationId xmlns:a16="http://schemas.microsoft.com/office/drawing/2014/main" id="{C77E4854-5556-482F-AD58-907A0F6C4C38}"/>
+              </a:ext>
+            </a:extLst>
+          </p:cNvPr>
+          <p:cNvSpPr txBox="1"/>
+          <p:nvPr/>
+        </p:nvSpPr>
+        <p:spPr>
+          <a:xfrm>
+            <a:off x="509092" y="3595719"/>
+            <a:ext cx="11321299" cy="1938992"/>
+          </a:xfrm>
+          <a:prstGeom prst="rect">
+            <a:avLst/>
+          </a:prstGeom>
+        </p:spPr>
+        <p:style>
+          <a:lnRef idx="1">
+            <a:schemeClr val="dk1"/>
+          </a:lnRef>
+          <a:fillRef idx="3">
+            <a:schemeClr val="dk1"/>
+          </a:fillRef>
+          <a:effectRef idx="2">
+            <a:schemeClr val="dk1"/>
+          </a:effectRef>
+          <a:fontRef idx="minor">
+            <a:schemeClr val="lt1"/>
+          </a:fontRef>
+        </p:style>
+        <p:txBody>
+          <a:bodyPr wrap="square" rtlCol="0">
+            <a:spAutoFit/>
+          </a:bodyPr>
+          <a:lstStyle/>
+          <a:p>
+            <a:r>
+              <a:rPr lang="pl-PL" sz="2400" i="1" dirty="0" err="1"/>
+              <a:t>Command</a:t>
+            </a:r>
+            <a:r>
+              <a:rPr lang="pl-PL" sz="2400" i="1" dirty="0"/>
+              <a:t>:	git </a:t>
+            </a:r>
+            <a:r>
+              <a:rPr lang="pl-PL" sz="2400" i="1" dirty="0" err="1"/>
+              <a:t>pull</a:t>
+            </a:r>
+            <a:endParaRPr lang="pl-PL" sz="2400" i="1" dirty="0"/>
+          </a:p>
+          <a:p>
+            <a:endParaRPr lang="pl-PL" sz="2400" i="1" dirty="0"/>
+          </a:p>
+          <a:p>
+            <a:r>
+              <a:rPr lang="pl-PL" sz="2400" i="1" dirty="0" err="1"/>
+              <a:t>Description</a:t>
+            </a:r>
+            <a:r>
+              <a:rPr lang="pl-PL" sz="2400" i="1" dirty="0"/>
+              <a:t>:  </a:t>
+            </a:r>
+            <a:r>
+              <a:rPr lang="pl-PL" sz="2400" i="1" dirty="0" err="1"/>
+              <a:t>let</a:t>
+            </a:r>
             <a:r>
               <a:rPr lang="pl-PL" sz="2400" i="1" dirty="0"/>
               <a:t> </a:t>
             </a:r>
-          </a:p>
-          <a:p>
+            <a:r>
+              <a:rPr lang="pl-PL" sz="2400" i="1" dirty="0" err="1"/>
+              <a:t>you</a:t>
+            </a:r>
+            <a:r>
+              <a:rPr lang="pl-PL" sz="2400" i="1" dirty="0"/>
+              <a:t> update </a:t>
+            </a:r>
+            <a:r>
+              <a:rPr lang="pl-PL" sz="2400" i="1" dirty="0" err="1"/>
+              <a:t>your</a:t>
+            </a:r>
+            <a:r>
+              <a:rPr lang="pl-PL" sz="2400" i="1" dirty="0"/>
+              <a:t>  </a:t>
+            </a:r>
+            <a:r>
+              <a:rPr lang="pl-PL" sz="2400" i="1" dirty="0" err="1"/>
+              <a:t>local</a:t>
+            </a:r>
+            <a:r>
+              <a:rPr lang="pl-PL" sz="2400" i="1" dirty="0"/>
+              <a:t> </a:t>
+            </a:r>
+            <a:r>
+              <a:rPr lang="pl-PL" sz="2400" i="1" dirty="0" err="1"/>
+              <a:t>repo</a:t>
+            </a:r>
             <a:endParaRPr lang="pl-PL" sz="2400" i="1" dirty="0"/>
           </a:p>
           <a:p>
+            <a:endParaRPr lang="pl-PL" sz="2400" i="1" dirty="0"/>
+          </a:p>
+          <a:p>
+            <a:r>
+              <a:rPr lang="pl-PL" sz="2400" i="1" dirty="0" err="1"/>
+              <a:t>Example</a:t>
+            </a:r>
+            <a:r>
+              <a:rPr lang="pl-PL" sz="2133" i="1" dirty="0"/>
+              <a:t>:  	</a:t>
+            </a:r>
+            <a:r>
+              <a:rPr lang="en-US" sz="2133" i="1" dirty="0"/>
+              <a:t>git </a:t>
+            </a:r>
+            <a:r>
+              <a:rPr lang="pl-PL" sz="2133" i="1" dirty="0" err="1"/>
+              <a:t>pull</a:t>
+            </a:r>
             <a:r>
               <a:rPr lang="pl-PL" sz="2400" i="1" dirty="0"/>
               <a:t>			 </a:t>

</xml_diff>